<commit_message>
update errors in poster
</commit_message>
<xml_diff>
--- a/documentation/Spring2020/poster.pptx
+++ b/documentation/Spring2020/poster.pptx
@@ -104,6 +104,11 @@
       </a:defRPr>
     </a:lvl9pPr>
   </p:defaultTextStyle>
+  <p:extLst>
+    <p:ext uri="{EFAFB233-063F-42B5-8137-9DF3F51BA10A}">
+      <p15:sldGuideLst xmlns:p15="http://schemas.microsoft.com/office/powerpoint/2012/main"/>
+    </p:ext>
+  </p:extLst>
 </p:presentation>
 </file>
 
@@ -2968,10 +2973,10 @@
       </p:grpSpPr>
       <p:pic>
         <p:nvPicPr>
-          <p:cNvPr id="7" name="Picture 6" descr="A screenshot of a cell phone&#10;&#10;Description automatically generated">
+          <p:cNvPr id="4" name="Picture 3">
             <a:extLst>
               <a:ext uri="{FF2B5EF4-FFF2-40B4-BE49-F238E27FC236}">
-                <a16:creationId xmlns:a16="http://schemas.microsoft.com/office/drawing/2014/main" id="{616B3407-808B-43DE-BE0A-546A7DE040B4}"/>
+                <a16:creationId xmlns:a16="http://schemas.microsoft.com/office/drawing/2014/main" id="{6D7BC7C6-53C8-4DA8-89D4-4649D110D73D}"/>
               </a:ext>
             </a:extLst>
           </p:cNvPr>

</xml_diff>